<commit_message>
new hands on powerpoint
</commit_message>
<xml_diff>
--- a/mtsummit.2013/hands-on.pptx
+++ b/mtsummit.2013/hands-on.pptx
@@ -1,8 +1,8 @@
 
 <file path=ppt/presentation.xml><?xml version="1.0" encoding="utf-8"?>
-<p:presentation xmlns:a="http://schemas.openxmlformats.org/drawingml/2006/main" xmlns:r="http://schemas.openxmlformats.org/officeDocument/2006/relationships" xmlns:mc="http://schemas.openxmlformats.org/markup-compatibility/2006" xmlns:mv="urn:schemas-microsoft-com:mac:vml" xmlns:p="http://schemas.openxmlformats.org/presentationml/2006/main" mc:Ignorable="mv" mc:PreserveAttributes="mv:*" saveSubsetFonts="1" autoCompressPictures="0">
+<p:presentation xmlns:a="http://schemas.openxmlformats.org/drawingml/2006/main" xmlns:r="http://schemas.openxmlformats.org/officeDocument/2006/relationships" xmlns:p="http://schemas.openxmlformats.org/presentationml/2006/main" saveSubsetFonts="1" autoCompressPictures="0">
   <p:sldMasterIdLst>
-    <p:sldMasterId r:id="rId1"/>
+    <p:sldMasterId id="2147483648" r:id="rId1"/>
   </p:sldMasterIdLst>
   <p:notesMasterIdLst>
     <p:notesMasterId r:id="rId18"/>
@@ -18,9 +18,9 @@
     <p:sldId id="272" r:id="rId9"/>
     <p:sldId id="273" r:id="rId10"/>
     <p:sldId id="263" r:id="rId11"/>
-    <p:sldId id="265" r:id="rId12"/>
-    <p:sldId id="266" r:id="rId13"/>
-    <p:sldId id="267" r:id="rId14"/>
+    <p:sldId id="274" r:id="rId12"/>
+    <p:sldId id="275" r:id="rId13"/>
+    <p:sldId id="276" r:id="rId14"/>
     <p:sldId id="268" r:id="rId15"/>
     <p:sldId id="269" r:id="rId16"/>
     <p:sldId id="270" r:id="rId17"/>
@@ -126,7 +126,7 @@
 </file>
 
 <file path=ppt/notesMasters/notesMaster1.xml><?xml version="1.0" encoding="utf-8"?>
-<p:notesMaster xmlns:a="http://schemas.openxmlformats.org/drawingml/2006/main" xmlns:r="http://schemas.openxmlformats.org/officeDocument/2006/relationships" xmlns:mc="http://schemas.openxmlformats.org/markup-compatibility/2006" xmlns:mv="urn:schemas-microsoft-com:mac:vml" xmlns:p="http://schemas.openxmlformats.org/presentationml/2006/main" mc:Ignorable="mv" mc:PreserveAttributes="mv:*">
+<p:notesMaster xmlns:a="http://schemas.openxmlformats.org/drawingml/2006/main" xmlns:r="http://schemas.openxmlformats.org/officeDocument/2006/relationships" xmlns:p="http://schemas.openxmlformats.org/presentationml/2006/main">
   <p:cSld>
     <p:bg>
       <p:bgRef idx="1001">
@@ -208,7 +208,7 @@
             <a:fld id="{A21CD23E-9C6D-3F4E-B356-8B36A5E4D680}" type="datetimeFigureOut">
               <a:rPr lang="en-US" smtClean="0"/>
               <a:pPr/>
-              <a:t>10/31/10</a:t>
+              <a:t>01/11/2012</a:t>
             </a:fld>
             <a:endParaRPr lang="en-US"/>
           </a:p>
@@ -377,6 +377,11 @@
         </p:txBody>
       </p:sp>
     </p:spTree>
+    <p:extLst>
+      <p:ext uri="{BB962C8B-B14F-4D97-AF65-F5344CB8AC3E}">
+        <p14:creationId xmlns:p14="http://schemas.microsoft.com/office/powerpoint/2010/main" val="82034212"/>
+      </p:ext>
+    </p:extLst>
   </p:cSld>
   <p:clrMap bg1="lt1" tx1="dk1" bg2="lt2" tx2="dk2" accent1="accent1" accent2="accent2" accent3="accent3" accent4="accent4" accent5="accent5" accent6="accent6" hlink="hlink" folHlink="folHlink"/>
   <p:notesStyle>
@@ -475,7 +480,7 @@
 </file>
 
 <file path=ppt/notesSlides/notesSlide1.xml><?xml version="1.0" encoding="utf-8"?>
-<p:notes xmlns:a="http://schemas.openxmlformats.org/drawingml/2006/main" xmlns:r="http://schemas.openxmlformats.org/officeDocument/2006/relationships" xmlns:mc="http://schemas.openxmlformats.org/markup-compatibility/2006" xmlns:mv="urn:schemas-microsoft-com:mac:vml" xmlns:p="http://schemas.openxmlformats.org/presentationml/2006/main" mc:Ignorable="mv" mc:PreserveAttributes="mv:*">
+<p:notes xmlns:a="http://schemas.openxmlformats.org/drawingml/2006/main" xmlns:r="http://schemas.openxmlformats.org/officeDocument/2006/relationships" xmlns:p="http://schemas.openxmlformats.org/presentationml/2006/main">
   <p:cSld>
     <p:spTree>
       <p:nvGrpSpPr>
@@ -640,7 +645,7 @@
 </file>
 
 <file path=ppt/notesSlides/notesSlide10.xml><?xml version="1.0" encoding="utf-8"?>
-<p:notes xmlns:a="http://schemas.openxmlformats.org/drawingml/2006/main" xmlns:r="http://schemas.openxmlformats.org/officeDocument/2006/relationships" xmlns:mc="http://schemas.openxmlformats.org/markup-compatibility/2006" xmlns:mv="urn:schemas-microsoft-com:mac:vml" xmlns:p="http://schemas.openxmlformats.org/presentationml/2006/main" mc:Ignorable="mv" mc:PreserveAttributes="mv:*">
+<p:notes xmlns:a="http://schemas.openxmlformats.org/drawingml/2006/main" xmlns:r="http://schemas.openxmlformats.org/officeDocument/2006/relationships" xmlns:p="http://schemas.openxmlformats.org/presentationml/2006/main">
   <p:cSld>
     <p:spTree>
       <p:nvGrpSpPr>
@@ -830,7 +835,7 @@
 </file>
 
 <file path=ppt/notesSlides/notesSlide11.xml><?xml version="1.0" encoding="utf-8"?>
-<p:notes xmlns:a="http://schemas.openxmlformats.org/drawingml/2006/main" xmlns:r="http://schemas.openxmlformats.org/officeDocument/2006/relationships" xmlns:mc="http://schemas.openxmlformats.org/markup-compatibility/2006" xmlns:mv="urn:schemas-microsoft-com:mac:vml" xmlns:p="http://schemas.openxmlformats.org/presentationml/2006/main" mc:Ignorable="mv" mc:PreserveAttributes="mv:*">
+<p:notes xmlns:a="http://schemas.openxmlformats.org/drawingml/2006/main" xmlns:r="http://schemas.openxmlformats.org/officeDocument/2006/relationships" xmlns:p="http://schemas.openxmlformats.org/presentationml/2006/main">
   <p:cSld>
     <p:spTree>
       <p:nvGrpSpPr>
@@ -1011,7 +1016,7 @@
 </file>
 
 <file path=ppt/notesSlides/notesSlide2.xml><?xml version="1.0" encoding="utf-8"?>
-<p:notes xmlns:a="http://schemas.openxmlformats.org/drawingml/2006/main" xmlns:r="http://schemas.openxmlformats.org/officeDocument/2006/relationships" xmlns:mc="http://schemas.openxmlformats.org/markup-compatibility/2006" xmlns:mv="urn:schemas-microsoft-com:mac:vml" xmlns:p="http://schemas.openxmlformats.org/presentationml/2006/main" mc:Ignorable="mv" mc:PreserveAttributes="mv:*">
+<p:notes xmlns:a="http://schemas.openxmlformats.org/drawingml/2006/main" xmlns:r="http://schemas.openxmlformats.org/officeDocument/2006/relationships" xmlns:p="http://schemas.openxmlformats.org/presentationml/2006/main">
   <p:cSld>
     <p:spTree>
       <p:nvGrpSpPr>
@@ -1178,7 +1183,7 @@
 </file>
 
 <file path=ppt/notesSlides/notesSlide3.xml><?xml version="1.0" encoding="utf-8"?>
-<p:notes xmlns:a="http://schemas.openxmlformats.org/drawingml/2006/main" xmlns:r="http://schemas.openxmlformats.org/officeDocument/2006/relationships" xmlns:mc="http://schemas.openxmlformats.org/markup-compatibility/2006" xmlns:mv="urn:schemas-microsoft-com:mac:vml" xmlns:p="http://schemas.openxmlformats.org/presentationml/2006/main" mc:Ignorable="mv" mc:PreserveAttributes="mv:*">
+<p:notes xmlns:a="http://schemas.openxmlformats.org/drawingml/2006/main" xmlns:r="http://schemas.openxmlformats.org/officeDocument/2006/relationships" xmlns:p="http://schemas.openxmlformats.org/presentationml/2006/main">
   <p:cSld>
     <p:spTree>
       <p:nvGrpSpPr>
@@ -1504,7 +1509,7 @@
 </file>
 
 <file path=ppt/notesSlides/notesSlide4.xml><?xml version="1.0" encoding="utf-8"?>
-<p:notes xmlns:a="http://schemas.openxmlformats.org/drawingml/2006/main" xmlns:r="http://schemas.openxmlformats.org/officeDocument/2006/relationships" xmlns:mc="http://schemas.openxmlformats.org/markup-compatibility/2006" xmlns:mv="urn:schemas-microsoft-com:mac:vml" xmlns:p="http://schemas.openxmlformats.org/presentationml/2006/main" mc:Ignorable="mv" mc:PreserveAttributes="mv:*">
+<p:notes xmlns:a="http://schemas.openxmlformats.org/drawingml/2006/main" xmlns:r="http://schemas.openxmlformats.org/officeDocument/2006/relationships" xmlns:p="http://schemas.openxmlformats.org/presentationml/2006/main">
   <p:cSld>
     <p:spTree>
       <p:nvGrpSpPr>
@@ -1662,7 +1667,7 @@
 </file>
 
 <file path=ppt/notesSlides/notesSlide5.xml><?xml version="1.0" encoding="utf-8"?>
-<p:notes xmlns:a="http://schemas.openxmlformats.org/drawingml/2006/main" xmlns:r="http://schemas.openxmlformats.org/officeDocument/2006/relationships" xmlns:mc="http://schemas.openxmlformats.org/markup-compatibility/2006" xmlns:mv="urn:schemas-microsoft-com:mac:vml" xmlns:p="http://schemas.openxmlformats.org/presentationml/2006/main" mc:Ignorable="mv" mc:PreserveAttributes="mv:*">
+<p:notes xmlns:a="http://schemas.openxmlformats.org/drawingml/2006/main" xmlns:r="http://schemas.openxmlformats.org/officeDocument/2006/relationships" xmlns:p="http://schemas.openxmlformats.org/presentationml/2006/main">
   <p:cSld>
     <p:spTree>
       <p:nvGrpSpPr>
@@ -1773,7 +1778,7 @@
 </file>
 
 <file path=ppt/notesSlides/notesSlide6.xml><?xml version="1.0" encoding="utf-8"?>
-<p:notes xmlns:a="http://schemas.openxmlformats.org/drawingml/2006/main" xmlns:r="http://schemas.openxmlformats.org/officeDocument/2006/relationships" xmlns:mc="http://schemas.openxmlformats.org/markup-compatibility/2006" xmlns:mv="urn:schemas-microsoft-com:mac:vml" xmlns:p="http://schemas.openxmlformats.org/presentationml/2006/main" mc:Ignorable="mv" mc:PreserveAttributes="mv:*">
+<p:notes xmlns:a="http://schemas.openxmlformats.org/drawingml/2006/main" xmlns:r="http://schemas.openxmlformats.org/officeDocument/2006/relationships" xmlns:p="http://schemas.openxmlformats.org/presentationml/2006/main">
   <p:cSld>
     <p:spTree>
       <p:nvGrpSpPr>
@@ -1891,7 +1896,7 @@
 </file>
 
 <file path=ppt/notesSlides/notesSlide7.xml><?xml version="1.0" encoding="utf-8"?>
-<p:notes xmlns:a="http://schemas.openxmlformats.org/drawingml/2006/main" xmlns:r="http://schemas.openxmlformats.org/officeDocument/2006/relationships" xmlns:mc="http://schemas.openxmlformats.org/markup-compatibility/2006" xmlns:mv="urn:schemas-microsoft-com:mac:vml" xmlns:p="http://schemas.openxmlformats.org/presentationml/2006/main" mc:Ignorable="mv" mc:PreserveAttributes="mv:*">
+<p:notes xmlns:a="http://schemas.openxmlformats.org/drawingml/2006/main" xmlns:r="http://schemas.openxmlformats.org/officeDocument/2006/relationships" xmlns:p="http://schemas.openxmlformats.org/presentationml/2006/main">
   <p:cSld>
     <p:spTree>
       <p:nvGrpSpPr>
@@ -2038,7 +2043,7 @@
 </file>
 
 <file path=ppt/notesSlides/notesSlide8.xml><?xml version="1.0" encoding="utf-8"?>
-<p:notes xmlns:a="http://schemas.openxmlformats.org/drawingml/2006/main" xmlns:r="http://schemas.openxmlformats.org/officeDocument/2006/relationships" xmlns:mc="http://schemas.openxmlformats.org/markup-compatibility/2006" xmlns:mv="urn:schemas-microsoft-com:mac:vml" xmlns:p="http://schemas.openxmlformats.org/presentationml/2006/main" mc:Ignorable="mv" mc:PreserveAttributes="mv:*">
+<p:notes xmlns:a="http://schemas.openxmlformats.org/drawingml/2006/main" xmlns:r="http://schemas.openxmlformats.org/officeDocument/2006/relationships" xmlns:p="http://schemas.openxmlformats.org/presentationml/2006/main">
   <p:cSld>
     <p:spTree>
       <p:nvGrpSpPr>
@@ -2185,7 +2190,7 @@
 </file>
 
 <file path=ppt/notesSlides/notesSlide9.xml><?xml version="1.0" encoding="utf-8"?>
-<p:notes xmlns:a="http://schemas.openxmlformats.org/drawingml/2006/main" xmlns:r="http://schemas.openxmlformats.org/officeDocument/2006/relationships" xmlns:mc="http://schemas.openxmlformats.org/markup-compatibility/2006" xmlns:mv="urn:schemas-microsoft-com:mac:vml" xmlns:p="http://schemas.openxmlformats.org/presentationml/2006/main" mc:Ignorable="mv" mc:PreserveAttributes="mv:*">
+<p:notes xmlns:a="http://schemas.openxmlformats.org/drawingml/2006/main" xmlns:r="http://schemas.openxmlformats.org/officeDocument/2006/relationships" xmlns:p="http://schemas.openxmlformats.org/presentationml/2006/main">
   <p:cSld>
     <p:spTree>
       <p:nvGrpSpPr>
@@ -2301,7 +2306,7 @@
 </file>
 
 <file path=ppt/slideLayouts/slideLayout1.xml><?xml version="1.0" encoding="utf-8"?>
-<p:sldLayout xmlns:a="http://schemas.openxmlformats.org/drawingml/2006/main" xmlns:r="http://schemas.openxmlformats.org/officeDocument/2006/relationships" xmlns:mc="http://schemas.openxmlformats.org/markup-compatibility/2006" xmlns:mv="urn:schemas-microsoft-com:mac:vml" xmlns:p="http://schemas.openxmlformats.org/presentationml/2006/main" mc:Ignorable="mv" mc:PreserveAttributes="mv:*" type="title" preserve="1">
+<p:sldLayout xmlns:a="http://schemas.openxmlformats.org/drawingml/2006/main" xmlns:r="http://schemas.openxmlformats.org/officeDocument/2006/relationships" xmlns:p="http://schemas.openxmlformats.org/presentationml/2006/main" type="title" preserve="1">
   <p:cSld name="Title Slide">
     <p:spTree>
       <p:nvGrpSpPr>
@@ -2482,7 +2487,7 @@
             <a:fld id="{91D24437-2522-E94A-8E59-511AAB2326EA}" type="datetimeFigureOut">
               <a:rPr lang="en-US" smtClean="0"/>
               <a:pPr/>
-              <a:t>10/31/10</a:t>
+              <a:t>01/11/2012</a:t>
             </a:fld>
             <a:endParaRPr lang="en-US"/>
           </a:p>
@@ -2540,7 +2545,7 @@
 </file>
 
 <file path=ppt/slideLayouts/slideLayout10.xml><?xml version="1.0" encoding="utf-8"?>
-<p:sldLayout xmlns:a="http://schemas.openxmlformats.org/drawingml/2006/main" xmlns:r="http://schemas.openxmlformats.org/officeDocument/2006/relationships" xmlns:mc="http://schemas.openxmlformats.org/markup-compatibility/2006" xmlns:mv="urn:schemas-microsoft-com:mac:vml" xmlns:p="http://schemas.openxmlformats.org/presentationml/2006/main" mc:Ignorable="mv" mc:PreserveAttributes="mv:*" type="vertTx" preserve="1">
+<p:sldLayout xmlns:a="http://schemas.openxmlformats.org/drawingml/2006/main" xmlns:r="http://schemas.openxmlformats.org/officeDocument/2006/relationships" xmlns:p="http://schemas.openxmlformats.org/presentationml/2006/main" type="vertTx" preserve="1">
   <p:cSld name="Title and Vertical Text">
     <p:spTree>
       <p:nvGrpSpPr>
@@ -2649,7 +2654,7 @@
             <a:fld id="{91D24437-2522-E94A-8E59-511AAB2326EA}" type="datetimeFigureOut">
               <a:rPr lang="en-US" smtClean="0"/>
               <a:pPr/>
-              <a:t>10/31/10</a:t>
+              <a:t>01/11/2012</a:t>
             </a:fld>
             <a:endParaRPr lang="en-US"/>
           </a:p>
@@ -2707,7 +2712,7 @@
 </file>
 
 <file path=ppt/slideLayouts/slideLayout11.xml><?xml version="1.0" encoding="utf-8"?>
-<p:sldLayout xmlns:a="http://schemas.openxmlformats.org/drawingml/2006/main" xmlns:r="http://schemas.openxmlformats.org/officeDocument/2006/relationships" xmlns:mc="http://schemas.openxmlformats.org/markup-compatibility/2006" xmlns:mv="urn:schemas-microsoft-com:mac:vml" xmlns:p="http://schemas.openxmlformats.org/presentationml/2006/main" mc:Ignorable="mv" mc:PreserveAttributes="mv:*" type="vertTitleAndTx" preserve="1">
+<p:sldLayout xmlns:a="http://schemas.openxmlformats.org/drawingml/2006/main" xmlns:r="http://schemas.openxmlformats.org/officeDocument/2006/relationships" xmlns:p="http://schemas.openxmlformats.org/presentationml/2006/main" type="vertTitleAndTx" preserve="1">
   <p:cSld name="Vertical Title and Text">
     <p:spTree>
       <p:nvGrpSpPr>
@@ -2826,7 +2831,7 @@
             <a:fld id="{91D24437-2522-E94A-8E59-511AAB2326EA}" type="datetimeFigureOut">
               <a:rPr lang="en-US" smtClean="0"/>
               <a:pPr/>
-              <a:t>10/31/10</a:t>
+              <a:t>01/11/2012</a:t>
             </a:fld>
             <a:endParaRPr lang="en-US"/>
           </a:p>
@@ -2884,7 +2889,7 @@
 </file>
 
 <file path=ppt/slideLayouts/slideLayout2.xml><?xml version="1.0" encoding="utf-8"?>
-<p:sldLayout xmlns:a="http://schemas.openxmlformats.org/drawingml/2006/main" xmlns:r="http://schemas.openxmlformats.org/officeDocument/2006/relationships" xmlns:mc="http://schemas.openxmlformats.org/markup-compatibility/2006" xmlns:mv="urn:schemas-microsoft-com:mac:vml" xmlns:p="http://schemas.openxmlformats.org/presentationml/2006/main" mc:Ignorable="mv" mc:PreserveAttributes="mv:*" type="obj" preserve="1">
+<p:sldLayout xmlns:a="http://schemas.openxmlformats.org/drawingml/2006/main" xmlns:r="http://schemas.openxmlformats.org/officeDocument/2006/relationships" xmlns:p="http://schemas.openxmlformats.org/presentationml/2006/main" type="obj" preserve="1">
   <p:cSld name="Title and Content">
     <p:spTree>
       <p:nvGrpSpPr>
@@ -2993,7 +2998,7 @@
             <a:fld id="{91D24437-2522-E94A-8E59-511AAB2326EA}" type="datetimeFigureOut">
               <a:rPr lang="en-US" smtClean="0"/>
               <a:pPr/>
-              <a:t>10/31/10</a:t>
+              <a:t>01/11/2012</a:t>
             </a:fld>
             <a:endParaRPr lang="en-US"/>
           </a:p>
@@ -3051,7 +3056,7 @@
 </file>
 
 <file path=ppt/slideLayouts/slideLayout3.xml><?xml version="1.0" encoding="utf-8"?>
-<p:sldLayout xmlns:a="http://schemas.openxmlformats.org/drawingml/2006/main" xmlns:r="http://schemas.openxmlformats.org/officeDocument/2006/relationships" xmlns:mc="http://schemas.openxmlformats.org/markup-compatibility/2006" xmlns:mv="urn:schemas-microsoft-com:mac:vml" xmlns:p="http://schemas.openxmlformats.org/presentationml/2006/main" mc:Ignorable="mv" mc:PreserveAttributes="mv:*" type="secHead" preserve="1">
+<p:sldLayout xmlns:a="http://schemas.openxmlformats.org/drawingml/2006/main" xmlns:r="http://schemas.openxmlformats.org/officeDocument/2006/relationships" xmlns:p="http://schemas.openxmlformats.org/presentationml/2006/main" type="secHead" preserve="1">
   <p:cSld name="Section Header">
     <p:spTree>
       <p:nvGrpSpPr>
@@ -3236,7 +3241,7 @@
             <a:fld id="{91D24437-2522-E94A-8E59-511AAB2326EA}" type="datetimeFigureOut">
               <a:rPr lang="en-US" smtClean="0"/>
               <a:pPr/>
-              <a:t>10/31/10</a:t>
+              <a:t>01/11/2012</a:t>
             </a:fld>
             <a:endParaRPr lang="en-US"/>
           </a:p>
@@ -3294,7 +3299,7 @@
 </file>
 
 <file path=ppt/slideLayouts/slideLayout4.xml><?xml version="1.0" encoding="utf-8"?>
-<p:sldLayout xmlns:a="http://schemas.openxmlformats.org/drawingml/2006/main" xmlns:r="http://schemas.openxmlformats.org/officeDocument/2006/relationships" xmlns:mc="http://schemas.openxmlformats.org/markup-compatibility/2006" xmlns:mv="urn:schemas-microsoft-com:mac:vml" xmlns:p="http://schemas.openxmlformats.org/presentationml/2006/main" mc:Ignorable="mv" mc:PreserveAttributes="mv:*" type="twoObj" preserve="1">
+<p:sldLayout xmlns:a="http://schemas.openxmlformats.org/drawingml/2006/main" xmlns:r="http://schemas.openxmlformats.org/officeDocument/2006/relationships" xmlns:p="http://schemas.openxmlformats.org/presentationml/2006/main" type="twoObj" preserve="1">
   <p:cSld name="Two Content">
     <p:spTree>
       <p:nvGrpSpPr>
@@ -3521,7 +3526,7 @@
             <a:fld id="{91D24437-2522-E94A-8E59-511AAB2326EA}" type="datetimeFigureOut">
               <a:rPr lang="en-US" smtClean="0"/>
               <a:pPr/>
-              <a:t>10/31/10</a:t>
+              <a:t>01/11/2012</a:t>
             </a:fld>
             <a:endParaRPr lang="en-US"/>
           </a:p>
@@ -3579,7 +3584,7 @@
 </file>
 
 <file path=ppt/slideLayouts/slideLayout5.xml><?xml version="1.0" encoding="utf-8"?>
-<p:sldLayout xmlns:a="http://schemas.openxmlformats.org/drawingml/2006/main" xmlns:r="http://schemas.openxmlformats.org/officeDocument/2006/relationships" xmlns:mc="http://schemas.openxmlformats.org/markup-compatibility/2006" xmlns:mv="urn:schemas-microsoft-com:mac:vml" xmlns:p="http://schemas.openxmlformats.org/presentationml/2006/main" mc:Ignorable="mv" mc:PreserveAttributes="mv:*" type="twoTxTwoObj" preserve="1">
+<p:sldLayout xmlns:a="http://schemas.openxmlformats.org/drawingml/2006/main" xmlns:r="http://schemas.openxmlformats.org/officeDocument/2006/relationships" xmlns:p="http://schemas.openxmlformats.org/presentationml/2006/main" type="twoTxTwoObj" preserve="1">
   <p:cSld name="Comparison">
     <p:spTree>
       <p:nvGrpSpPr>
@@ -3940,7 +3945,7 @@
             <a:fld id="{91D24437-2522-E94A-8E59-511AAB2326EA}" type="datetimeFigureOut">
               <a:rPr lang="en-US" smtClean="0"/>
               <a:pPr/>
-              <a:t>10/31/10</a:t>
+              <a:t>01/11/2012</a:t>
             </a:fld>
             <a:endParaRPr lang="en-US"/>
           </a:p>
@@ -3998,7 +4003,7 @@
 </file>
 
 <file path=ppt/slideLayouts/slideLayout6.xml><?xml version="1.0" encoding="utf-8"?>
-<p:sldLayout xmlns:a="http://schemas.openxmlformats.org/drawingml/2006/main" xmlns:r="http://schemas.openxmlformats.org/officeDocument/2006/relationships" xmlns:mc="http://schemas.openxmlformats.org/markup-compatibility/2006" xmlns:mv="urn:schemas-microsoft-com:mac:vml" xmlns:p="http://schemas.openxmlformats.org/presentationml/2006/main" mc:Ignorable="mv" mc:PreserveAttributes="mv:*" type="titleOnly" preserve="1">
+<p:sldLayout xmlns:a="http://schemas.openxmlformats.org/drawingml/2006/main" xmlns:r="http://schemas.openxmlformats.org/officeDocument/2006/relationships" xmlns:p="http://schemas.openxmlformats.org/presentationml/2006/main" type="titleOnly" preserve="1">
   <p:cSld name="Title Only">
     <p:spTree>
       <p:nvGrpSpPr>
@@ -4055,7 +4060,7 @@
             <a:fld id="{91D24437-2522-E94A-8E59-511AAB2326EA}" type="datetimeFigureOut">
               <a:rPr lang="en-US" smtClean="0"/>
               <a:pPr/>
-              <a:t>10/31/10</a:t>
+              <a:t>01/11/2012</a:t>
             </a:fld>
             <a:endParaRPr lang="en-US"/>
           </a:p>
@@ -4113,7 +4118,7 @@
 </file>
 
 <file path=ppt/slideLayouts/slideLayout7.xml><?xml version="1.0" encoding="utf-8"?>
-<p:sldLayout xmlns:a="http://schemas.openxmlformats.org/drawingml/2006/main" xmlns:r="http://schemas.openxmlformats.org/officeDocument/2006/relationships" xmlns:mc="http://schemas.openxmlformats.org/markup-compatibility/2006" xmlns:mv="urn:schemas-microsoft-com:mac:vml" xmlns:p="http://schemas.openxmlformats.org/presentationml/2006/main" mc:Ignorable="mv" mc:PreserveAttributes="mv:*" type="blank" preserve="1">
+<p:sldLayout xmlns:a="http://schemas.openxmlformats.org/drawingml/2006/main" xmlns:r="http://schemas.openxmlformats.org/officeDocument/2006/relationships" xmlns:p="http://schemas.openxmlformats.org/presentationml/2006/main" type="blank" preserve="1">
   <p:cSld name="Blank">
     <p:spTree>
       <p:nvGrpSpPr>
@@ -4147,7 +4152,7 @@
             <a:fld id="{91D24437-2522-E94A-8E59-511AAB2326EA}" type="datetimeFigureOut">
               <a:rPr lang="en-US" smtClean="0"/>
               <a:pPr/>
-              <a:t>10/31/10</a:t>
+              <a:t>01/11/2012</a:t>
             </a:fld>
             <a:endParaRPr lang="en-US"/>
           </a:p>
@@ -4205,7 +4210,7 @@
 </file>
 
 <file path=ppt/slideLayouts/slideLayout8.xml><?xml version="1.0" encoding="utf-8"?>
-<p:sldLayout xmlns:a="http://schemas.openxmlformats.org/drawingml/2006/main" xmlns:r="http://schemas.openxmlformats.org/officeDocument/2006/relationships" xmlns:mc="http://schemas.openxmlformats.org/markup-compatibility/2006" xmlns:mv="urn:schemas-microsoft-com:mac:vml" xmlns:p="http://schemas.openxmlformats.org/presentationml/2006/main" mc:Ignorable="mv" mc:PreserveAttributes="mv:*" type="objTx" preserve="1">
+<p:sldLayout xmlns:a="http://schemas.openxmlformats.org/drawingml/2006/main" xmlns:r="http://schemas.openxmlformats.org/officeDocument/2006/relationships" xmlns:p="http://schemas.openxmlformats.org/presentationml/2006/main" type="objTx" preserve="1">
   <p:cSld name="Content with Caption">
     <p:spTree>
       <p:nvGrpSpPr>
@@ -4421,7 +4426,7 @@
             <a:fld id="{91D24437-2522-E94A-8E59-511AAB2326EA}" type="datetimeFigureOut">
               <a:rPr lang="en-US" smtClean="0"/>
               <a:pPr/>
-              <a:t>10/31/10</a:t>
+              <a:t>01/11/2012</a:t>
             </a:fld>
             <a:endParaRPr lang="en-US"/>
           </a:p>
@@ -4479,7 +4484,7 @@
 </file>
 
 <file path=ppt/slideLayouts/slideLayout9.xml><?xml version="1.0" encoding="utf-8"?>
-<p:sldLayout xmlns:a="http://schemas.openxmlformats.org/drawingml/2006/main" xmlns:r="http://schemas.openxmlformats.org/officeDocument/2006/relationships" xmlns:mc="http://schemas.openxmlformats.org/markup-compatibility/2006" xmlns:mv="urn:schemas-microsoft-com:mac:vml" xmlns:p="http://schemas.openxmlformats.org/presentationml/2006/main" mc:Ignorable="mv" mc:PreserveAttributes="mv:*" type="picTx" preserve="1">
+<p:sldLayout xmlns:a="http://schemas.openxmlformats.org/drawingml/2006/main" xmlns:r="http://schemas.openxmlformats.org/officeDocument/2006/relationships" xmlns:p="http://schemas.openxmlformats.org/presentationml/2006/main" type="picTx" preserve="1">
   <p:cSld name="Picture with Caption">
     <p:spTree>
       <p:nvGrpSpPr>
@@ -4671,7 +4676,7 @@
             <a:fld id="{91D24437-2522-E94A-8E59-511AAB2326EA}" type="datetimeFigureOut">
               <a:rPr lang="en-US" smtClean="0"/>
               <a:pPr/>
-              <a:t>10/31/10</a:t>
+              <a:t>01/11/2012</a:t>
             </a:fld>
             <a:endParaRPr lang="en-US"/>
           </a:p>
@@ -4729,7 +4734,7 @@
 </file>
 
 <file path=ppt/slideMasters/slideMaster1.xml><?xml version="1.0" encoding="utf-8"?>
-<p:sldMaster xmlns:a="http://schemas.openxmlformats.org/drawingml/2006/main" xmlns:r="http://schemas.openxmlformats.org/officeDocument/2006/relationships" xmlns:mc="http://schemas.openxmlformats.org/markup-compatibility/2006" xmlns:mv="urn:schemas-microsoft-com:mac:vml" xmlns:p="http://schemas.openxmlformats.org/presentationml/2006/main" mc:Ignorable="mv" mc:PreserveAttributes="mv:*">
+<p:sldMaster xmlns:a="http://schemas.openxmlformats.org/drawingml/2006/main" xmlns:r="http://schemas.openxmlformats.org/officeDocument/2006/relationships" xmlns:p="http://schemas.openxmlformats.org/presentationml/2006/main">
   <p:cSld>
     <p:bg>
       <p:bgRef idx="1001">
@@ -4881,7 +4886,7 @@
             <a:fld id="{91D24437-2522-E94A-8E59-511AAB2326EA}" type="datetimeFigureOut">
               <a:rPr lang="en-US" smtClean="0"/>
               <a:pPr/>
-              <a:t>10/31/10</a:t>
+              <a:t>01/11/2012</a:t>
             </a:fld>
             <a:endParaRPr lang="en-US"/>
           </a:p>
@@ -4994,17 +4999,17 @@
   </p:cSld>
   <p:clrMap bg1="lt1" tx1="dk1" bg2="lt2" tx2="dk2" accent1="accent1" accent2="accent2" accent3="accent3" accent4="accent4" accent5="accent5" accent6="accent6" hlink="hlink" folHlink="folHlink"/>
   <p:sldLayoutIdLst>
-    <p:sldLayoutId r:id="rId1"/>
-    <p:sldLayoutId r:id="rId2"/>
-    <p:sldLayoutId r:id="rId3"/>
-    <p:sldLayoutId r:id="rId4"/>
-    <p:sldLayoutId r:id="rId5"/>
-    <p:sldLayoutId r:id="rId6"/>
-    <p:sldLayoutId r:id="rId7"/>
-    <p:sldLayoutId r:id="rId8"/>
-    <p:sldLayoutId r:id="rId9"/>
-    <p:sldLayoutId r:id="rId10"/>
-    <p:sldLayoutId r:id="rId11"/>
+    <p:sldLayoutId id="2147483649" r:id="rId1"/>
+    <p:sldLayoutId id="2147483650" r:id="rId2"/>
+    <p:sldLayoutId id="2147483651" r:id="rId3"/>
+    <p:sldLayoutId id="2147483652" r:id="rId4"/>
+    <p:sldLayoutId id="2147483653" r:id="rId5"/>
+    <p:sldLayoutId id="2147483654" r:id="rId6"/>
+    <p:sldLayoutId id="2147483655" r:id="rId7"/>
+    <p:sldLayoutId id="2147483656" r:id="rId8"/>
+    <p:sldLayoutId id="2147483657" r:id="rId9"/>
+    <p:sldLayoutId id="2147483658" r:id="rId10"/>
+    <p:sldLayoutId id="2147483659" r:id="rId11"/>
   </p:sldLayoutIdLst>
   <p:txStyles>
     <p:titleStyle>
@@ -5260,7 +5265,7 @@
 </file>
 
 <file path=ppt/slides/slide1.xml><?xml version="1.0" encoding="utf-8"?>
-<p:sld xmlns:a="http://schemas.openxmlformats.org/drawingml/2006/main" xmlns:r="http://schemas.openxmlformats.org/officeDocument/2006/relationships" xmlns:mc="http://schemas.openxmlformats.org/markup-compatibility/2006" xmlns:mv="urn:schemas-microsoft-com:mac:vml" xmlns:p="http://schemas.openxmlformats.org/presentationml/2006/main" mc:Ignorable="mv" mc:PreserveAttributes="mv:*">
+<p:sld xmlns:a="http://schemas.openxmlformats.org/drawingml/2006/main" xmlns:r="http://schemas.openxmlformats.org/officeDocument/2006/relationships" xmlns:p="http://schemas.openxmlformats.org/presentationml/2006/main">
   <p:cSld>
     <p:spTree>
       <p:nvGrpSpPr>
@@ -5351,15 +5356,15 @@
           <a:p>
             <a:r>
               <a:rPr lang="en-US" sz="3097" dirty="0" smtClean="0"/>
-              <a:t>4</a:t>
+              <a:t>1</a:t>
             </a:r>
             <a:r>
               <a:rPr lang="en-US" sz="3097" baseline="30000" dirty="0" smtClean="0"/>
-              <a:t>th</a:t>
+              <a:t>st</a:t>
             </a:r>
             <a:r>
               <a:rPr lang="en-US" sz="3097" dirty="0" smtClean="0"/>
-              <a:t> November, 2010</a:t>
+              <a:t> November, 2012</a:t>
             </a:r>
             <a:endParaRPr lang="en-US" sz="3097" dirty="0"/>
           </a:p>
@@ -5439,11 +5444,18 @@
   <p:clrMapOvr>
     <a:masterClrMapping/>
   </p:clrMapOvr>
+  <p:timing>
+    <p:tnLst>
+      <p:par>
+        <p:cTn xmlns:p14="http://schemas.microsoft.com/office/powerpoint/2010/main" id="1" dur="indefinite" restart="never" nodeType="tmRoot"/>
+      </p:par>
+    </p:tnLst>
+  </p:timing>
 </p:sld>
 </file>
 
 <file path=ppt/slides/slide10.xml><?xml version="1.0" encoding="utf-8"?>
-<p:sld xmlns:a="http://schemas.openxmlformats.org/drawingml/2006/main" xmlns:r="http://schemas.openxmlformats.org/officeDocument/2006/relationships" xmlns:mc="http://schemas.openxmlformats.org/markup-compatibility/2006" xmlns:mv="urn:schemas-microsoft-com:mac:vml" xmlns:p="http://schemas.openxmlformats.org/presentationml/2006/main" mc:Ignorable="mv" mc:PreserveAttributes="mv:*">
+<p:sld xmlns:a="http://schemas.openxmlformats.org/drawingml/2006/main" xmlns:r="http://schemas.openxmlformats.org/officeDocument/2006/relationships" xmlns:p="http://schemas.openxmlformats.org/presentationml/2006/main">
   <p:cSld>
     <p:spTree>
       <p:nvGrpSpPr>
@@ -5650,7 +5662,7 @@
 </file>
 
 <file path=ppt/slides/slide11.xml><?xml version="1.0" encoding="utf-8"?>
-<p:sld xmlns:a="http://schemas.openxmlformats.org/drawingml/2006/main" xmlns:r="http://schemas.openxmlformats.org/officeDocument/2006/relationships" xmlns:mc="http://schemas.openxmlformats.org/markup-compatibility/2006" xmlns:mv="urn:schemas-microsoft-com:mac:vml" xmlns:p="http://schemas.openxmlformats.org/presentationml/2006/main" mc:Ignorable="mv" mc:PreserveAttributes="mv:*">
+<p:sld xmlns:a="http://schemas.openxmlformats.org/drawingml/2006/main" xmlns:r="http://schemas.openxmlformats.org/officeDocument/2006/relationships" xmlns:p="http://schemas.openxmlformats.org/presentationml/2006/main">
   <p:cSld>
     <p:spTree>
       <p:nvGrpSpPr>
@@ -5939,13 +5951,8 @@
           <a:p>
             <a:r>
               <a:rPr lang="en-US" sz="2400" dirty="0" smtClean="0"/>
-              <a:t>    	- ‘FULL</a:t>
-            </a:r>
-            <a:r>
-              <a:rPr lang="en-US" sz="2400" dirty="0" smtClean="0"/>
-              <a:t> NEWS COMM’    </a:t>
-            </a:r>
-            <a:endParaRPr lang="en-US" sz="2400" dirty="0" smtClean="0"/>
+              <a:t>    	- ‘FULL NEWS COMM’    </a:t>
+            </a:r>
           </a:p>
           <a:p>
             <a:endParaRPr lang="en-US" sz="2400" dirty="0" smtClean="0"/>
@@ -5962,6 +5969,11 @@
         </p:txBody>
       </p:sp>
     </p:spTree>
+    <p:extLst>
+      <p:ext uri="{BB962C8B-B14F-4D97-AF65-F5344CB8AC3E}">
+        <p14:creationId xmlns:p14="http://schemas.microsoft.com/office/powerpoint/2010/main" val="1179439984"/>
+      </p:ext>
+    </p:extLst>
   </p:cSld>
   <p:clrMapOvr>
     <a:masterClrMapping/>
@@ -5970,7 +5982,7 @@
 </file>
 
 <file path=ppt/slides/slide12.xml><?xml version="1.0" encoding="utf-8"?>
-<p:sld xmlns:a="http://schemas.openxmlformats.org/drawingml/2006/main" xmlns:r="http://schemas.openxmlformats.org/officeDocument/2006/relationships" xmlns:mc="http://schemas.openxmlformats.org/markup-compatibility/2006" xmlns:mv="urn:schemas-microsoft-com:mac:vml" xmlns:p="http://schemas.openxmlformats.org/presentationml/2006/main" mc:Ignorable="mv" mc:PreserveAttributes="mv:*">
+<p:sld xmlns:a="http://schemas.openxmlformats.org/drawingml/2006/main" xmlns:r="http://schemas.openxmlformats.org/officeDocument/2006/relationships" xmlns:p="http://schemas.openxmlformats.org/presentationml/2006/main">
   <p:cSld>
     <p:spTree>
       <p:nvGrpSpPr>
@@ -6148,6 +6160,11 @@
         </p:txBody>
       </p:sp>
     </p:spTree>
+    <p:extLst>
+      <p:ext uri="{BB962C8B-B14F-4D97-AF65-F5344CB8AC3E}">
+        <p14:creationId xmlns:p14="http://schemas.microsoft.com/office/powerpoint/2010/main" val="871449092"/>
+      </p:ext>
+    </p:extLst>
   </p:cSld>
   <p:clrMapOvr>
     <a:masterClrMapping/>
@@ -6156,7 +6173,7 @@
 </file>
 
 <file path=ppt/slides/slide13.xml><?xml version="1.0" encoding="utf-8"?>
-<p:sld xmlns:a="http://schemas.openxmlformats.org/drawingml/2006/main" xmlns:r="http://schemas.openxmlformats.org/officeDocument/2006/relationships" xmlns:mc="http://schemas.openxmlformats.org/markup-compatibility/2006" xmlns:mv="urn:schemas-microsoft-com:mac:vml" xmlns:p="http://schemas.openxmlformats.org/presentationml/2006/main" mc:Ignorable="mv" mc:PreserveAttributes="mv:*">
+<p:sld xmlns:a="http://schemas.openxmlformats.org/drawingml/2006/main" xmlns:r="http://schemas.openxmlformats.org/officeDocument/2006/relationships" xmlns:p="http://schemas.openxmlformats.org/presentationml/2006/main">
   <p:cSld>
     <p:spTree>
       <p:nvGrpSpPr>
@@ -6338,6 +6355,11 @@
         </p:spPr>
       </p:pic>
     </p:spTree>
+    <p:extLst>
+      <p:ext uri="{BB962C8B-B14F-4D97-AF65-F5344CB8AC3E}">
+        <p14:creationId xmlns:p14="http://schemas.microsoft.com/office/powerpoint/2010/main" val="1193011206"/>
+      </p:ext>
+    </p:extLst>
   </p:cSld>
   <p:clrMapOvr>
     <a:masterClrMapping/>
@@ -6346,7 +6368,7 @@
 </file>
 
 <file path=ppt/slides/slide14.xml><?xml version="1.0" encoding="utf-8"?>
-<p:sld xmlns:a="http://schemas.openxmlformats.org/drawingml/2006/main" xmlns:r="http://schemas.openxmlformats.org/officeDocument/2006/relationships" xmlns:mc="http://schemas.openxmlformats.org/markup-compatibility/2006" xmlns:mv="urn:schemas-microsoft-com:mac:vml" xmlns:p="http://schemas.openxmlformats.org/presentationml/2006/main" mc:Ignorable="mv" mc:PreserveAttributes="mv:*">
+<p:sld xmlns:a="http://schemas.openxmlformats.org/drawingml/2006/main" xmlns:r="http://schemas.openxmlformats.org/officeDocument/2006/relationships" xmlns:p="http://schemas.openxmlformats.org/presentationml/2006/main">
   <p:cSld>
     <p:spTree>
       <p:nvGrpSpPr>
@@ -6446,7 +6468,7 @@
 </file>
 
 <file path=ppt/slides/slide15.xml><?xml version="1.0" encoding="utf-8"?>
-<p:sld xmlns:a="http://schemas.openxmlformats.org/drawingml/2006/main" xmlns:r="http://schemas.openxmlformats.org/officeDocument/2006/relationships" xmlns:mc="http://schemas.openxmlformats.org/markup-compatibility/2006" xmlns:mv="urn:schemas-microsoft-com:mac:vml" xmlns:p="http://schemas.openxmlformats.org/presentationml/2006/main" mc:Ignorable="mv" mc:PreserveAttributes="mv:*">
+<p:sld xmlns:a="http://schemas.openxmlformats.org/drawingml/2006/main" xmlns:r="http://schemas.openxmlformats.org/officeDocument/2006/relationships" xmlns:p="http://schemas.openxmlformats.org/presentationml/2006/main">
   <p:cSld>
     <p:spTree>
       <p:nvGrpSpPr>
@@ -6582,7 +6604,7 @@
 </file>
 
 <file path=ppt/slides/slide16.xml><?xml version="1.0" encoding="utf-8"?>
-<p:sld xmlns:a="http://schemas.openxmlformats.org/drawingml/2006/main" xmlns:r="http://schemas.openxmlformats.org/officeDocument/2006/relationships" xmlns:mc="http://schemas.openxmlformats.org/markup-compatibility/2006" xmlns:mv="urn:schemas-microsoft-com:mac:vml" xmlns:p="http://schemas.openxmlformats.org/presentationml/2006/main" mc:Ignorable="mv" mc:PreserveAttributes="mv:*">
+<p:sld xmlns:a="http://schemas.openxmlformats.org/drawingml/2006/main" xmlns:r="http://schemas.openxmlformats.org/officeDocument/2006/relationships" xmlns:p="http://schemas.openxmlformats.org/presentationml/2006/main">
   <p:cSld>
     <p:spTree>
       <p:nvGrpSpPr>
@@ -6690,13 +6712,8 @@
             <a:pPr lvl="1"/>
             <a:r>
               <a:rPr lang="en-US" dirty="0" smtClean="0"/>
-              <a:t>Multi-</a:t>
-            </a:r>
-            <a:r>
-              <a:rPr lang="en-US" dirty="0" smtClean="0"/>
-              <a:t>threading</a:t>
-            </a:r>
-            <a:endParaRPr lang="en-US" dirty="0" smtClean="0"/>
+              <a:t>Multi-threading</a:t>
+            </a:r>
           </a:p>
           <a:p>
             <a:pPr lvl="1"/>
@@ -6713,7 +6730,7 @@
 </file>
 
 <file path=ppt/slides/slide2.xml><?xml version="1.0" encoding="utf-8"?>
-<p:sld xmlns:a="http://schemas.openxmlformats.org/drawingml/2006/main" xmlns:r="http://schemas.openxmlformats.org/officeDocument/2006/relationships" xmlns:mc="http://schemas.openxmlformats.org/markup-compatibility/2006" xmlns:mv="urn:schemas-microsoft-com:mac:vml" xmlns:p="http://schemas.openxmlformats.org/presentationml/2006/main" mc:Ignorable="mv" mc:PreserveAttributes="mv:*">
+<p:sld xmlns:a="http://schemas.openxmlformats.org/drawingml/2006/main" xmlns:r="http://schemas.openxmlformats.org/officeDocument/2006/relationships" xmlns:p="http://schemas.openxmlformats.org/presentationml/2006/main">
   <p:cSld>
     <p:spTree>
       <p:nvGrpSpPr>
@@ -7319,11 +7336,18 @@
   <p:clrMapOvr>
     <a:masterClrMapping/>
   </p:clrMapOvr>
+  <p:timing>
+    <p:tnLst>
+      <p:par>
+        <p:cTn xmlns:p14="http://schemas.microsoft.com/office/powerpoint/2010/main" id="1" dur="indefinite" restart="never" nodeType="tmRoot"/>
+      </p:par>
+    </p:tnLst>
+  </p:timing>
 </p:sld>
 </file>
 
 <file path=ppt/slides/slide3.xml><?xml version="1.0" encoding="utf-8"?>
-<p:sld xmlns:a="http://schemas.openxmlformats.org/drawingml/2006/main" xmlns:r="http://schemas.openxmlformats.org/officeDocument/2006/relationships" xmlns:mc="http://schemas.openxmlformats.org/markup-compatibility/2006" xmlns:mv="urn:schemas-microsoft-com:mac:vml" xmlns:p="http://schemas.openxmlformats.org/presentationml/2006/main" mc:Ignorable="mv" mc:PreserveAttributes="mv:*">
+<p:sld xmlns:a="http://schemas.openxmlformats.org/drawingml/2006/main" xmlns:r="http://schemas.openxmlformats.org/officeDocument/2006/relationships" xmlns:p="http://schemas.openxmlformats.org/presentationml/2006/main">
   <p:cSld>
     <p:spTree>
       <p:nvGrpSpPr>
@@ -7377,19 +7401,17 @@
         <p:spPr/>
         <p:txBody>
           <a:bodyPr>
-            <a:normAutofit fontScale="92500" lnSpcReduction="20000"/>
+            <a:normAutofit lnSpcReduction="10000"/>
           </a:bodyPr>
           <a:lstStyle/>
           <a:p>
             <a:r>
               <a:rPr lang="en-US" dirty="0" smtClean="0"/>
-              <a:t>More details later….</a:t>
-            </a:r>
-          </a:p>
-          <a:p>
-            <a:r>
-              <a:rPr lang="en-US" dirty="0" smtClean="0"/>
-              <a:t>In brief </a:t>
+              <a:t>In </a:t>
+            </a:r>
+            <a:r>
+              <a:rPr lang="en-US" dirty="0" smtClean="0"/>
+              <a:t>brief </a:t>
             </a:r>
           </a:p>
           <a:p>
@@ -7461,11 +7483,18 @@
   <p:clrMapOvr>
     <a:masterClrMapping/>
   </p:clrMapOvr>
+  <p:timing>
+    <p:tnLst>
+      <p:par>
+        <p:cTn xmlns:p14="http://schemas.microsoft.com/office/powerpoint/2010/main" id="1" dur="indefinite" restart="never" nodeType="tmRoot"/>
+      </p:par>
+    </p:tnLst>
+  </p:timing>
 </p:sld>
 </file>
 
 <file path=ppt/slides/slide4.xml><?xml version="1.0" encoding="utf-8"?>
-<p:sld xmlns:a="http://schemas.openxmlformats.org/drawingml/2006/main" xmlns:r="http://schemas.openxmlformats.org/officeDocument/2006/relationships" xmlns:mc="http://schemas.openxmlformats.org/markup-compatibility/2006" xmlns:mv="urn:schemas-microsoft-com:mac:vml" xmlns:p="http://schemas.openxmlformats.org/presentationml/2006/main" mc:Ignorable="mv" mc:PreserveAttributes="mv:*">
+<p:sld xmlns:a="http://schemas.openxmlformats.org/drawingml/2006/main" xmlns:r="http://schemas.openxmlformats.org/officeDocument/2006/relationships" xmlns:p="http://schemas.openxmlformats.org/presentationml/2006/main">
   <p:cSld>
     <p:spTree>
       <p:nvGrpSpPr>
@@ -7534,7 +7563,7 @@
             </a:r>
             <a:r>
               <a:rPr lang="en-US" dirty="0" err="1" smtClean="0"/>
-              <a:t>guest@odin.inf.ed.ac.uk</a:t>
+              <a:t>guest@thor.inf.ed.ac.uk</a:t>
             </a:r>
             <a:endParaRPr lang="en-US" dirty="0" smtClean="0"/>
           </a:p>
@@ -7558,12 +7587,20 @@
               <a:buNone/>
             </a:pPr>
             <a:r>
+              <a:rPr lang="en-US" dirty="0" smtClean="0"/>
+              <a:t>cd workspace/</a:t>
+            </a:r>
+            <a:r>
+              <a:rPr lang="en-US" dirty="0" smtClean="0"/>
+              <a:t>experiment/</a:t>
+            </a:r>
+            <a:r>
               <a:rPr lang="en-US" dirty="0" err="1" smtClean="0"/>
-              <a:t>cd</a:t>
-            </a:r>
-            <a:r>
-              <a:rPr lang="en-US" dirty="0" smtClean="0"/>
-              <a:t> workspace/exp/</a:t>
+              <a:t>fr</a:t>
+            </a:r>
+            <a:r>
+              <a:rPr lang="en-US" dirty="0" smtClean="0"/>
+              <a:t>-en/</a:t>
             </a:r>
             <a:r>
               <a:rPr lang="en-US" dirty="0" smtClean="0">
@@ -7571,12 +7608,13 @@
                   <a:srgbClr val="FF0000"/>
                 </a:solidFill>
               </a:rPr>
-              <a:t>&lt;fruit&gt;</a:t>
-            </a:r>
-            <a:r>
-              <a:rPr lang="en-US" dirty="0" smtClean="0"/>
-              <a:t>/working-dir</a:t>
-            </a:r>
+              <a:t>&lt;river&gt;</a:t>
+            </a:r>
+            <a:r>
+              <a:rPr lang="en-US" dirty="0" smtClean="0"/>
+              <a:t>/</a:t>
+            </a:r>
+            <a:endParaRPr lang="en-US" dirty="0" smtClean="0"/>
           </a:p>
           <a:p>
             <a:pPr>
@@ -7592,11 +7630,19 @@
             </a:r>
             <a:r>
               <a:rPr lang="en-US" dirty="0" smtClean="0"/>
-              <a:t> ../</a:t>
+              <a:t> </a:t>
+            </a:r>
+            <a:r>
+              <a:rPr lang="en-US" dirty="0" smtClean="0"/>
+              <a:t> .</a:t>
+            </a:r>
+            <a:r>
+              <a:rPr lang="en-US" dirty="0" smtClean="0"/>
+              <a:t>/</a:t>
             </a:r>
             <a:r>
               <a:rPr lang="en-US" dirty="0" err="1" smtClean="0"/>
-              <a:t>run.basic.sh</a:t>
+              <a:t>run.pb.sh</a:t>
             </a:r>
             <a:r>
               <a:rPr lang="en-US" dirty="0" smtClean="0"/>
@@ -7789,11 +7835,18 @@
   <p:clrMapOvr>
     <a:masterClrMapping/>
   </p:clrMapOvr>
+  <p:timing>
+    <p:tnLst>
+      <p:par>
+        <p:cTn xmlns:p14="http://schemas.microsoft.com/office/powerpoint/2010/main" id="1" dur="indefinite" restart="never" nodeType="tmRoot"/>
+      </p:par>
+    </p:tnLst>
+  </p:timing>
 </p:sld>
 </file>
 
 <file path=ppt/slides/slide5.xml><?xml version="1.0" encoding="utf-8"?>
-<p:sld xmlns:a="http://schemas.openxmlformats.org/drawingml/2006/main" xmlns:r="http://schemas.openxmlformats.org/officeDocument/2006/relationships" xmlns:mc="http://schemas.openxmlformats.org/markup-compatibility/2006" xmlns:mv="urn:schemas-microsoft-com:mac:vml" xmlns:p="http://schemas.openxmlformats.org/presentationml/2006/main" mc:Ignorable="mv" mc:PreserveAttributes="mv:*">
+<p:sld xmlns:a="http://schemas.openxmlformats.org/drawingml/2006/main" xmlns:r="http://schemas.openxmlformats.org/officeDocument/2006/relationships" xmlns:p="http://schemas.openxmlformats.org/presentationml/2006/main">
   <p:cSld>
     <p:spTree>
       <p:nvGrpSpPr>
@@ -7861,11 +7914,18 @@
   <p:clrMapOvr>
     <a:masterClrMapping/>
   </p:clrMapOvr>
+  <p:timing>
+    <p:tnLst>
+      <p:par>
+        <p:cTn xmlns:p14="http://schemas.microsoft.com/office/powerpoint/2010/main" id="1" dur="indefinite" restart="never" nodeType="tmRoot"/>
+      </p:par>
+    </p:tnLst>
+  </p:timing>
 </p:sld>
 </file>
 
 <file path=ppt/slides/slide6.xml><?xml version="1.0" encoding="utf-8"?>
-<p:sld xmlns:a="http://schemas.openxmlformats.org/drawingml/2006/main" xmlns:r="http://schemas.openxmlformats.org/officeDocument/2006/relationships" xmlns:mc="http://schemas.openxmlformats.org/markup-compatibility/2006" xmlns:mv="urn:schemas-microsoft-com:mac:vml" xmlns:p="http://schemas.openxmlformats.org/presentationml/2006/main" mc:Ignorable="mv" mc:PreserveAttributes="mv:*">
+<p:sld xmlns:a="http://schemas.openxmlformats.org/drawingml/2006/main" xmlns:r="http://schemas.openxmlformats.org/officeDocument/2006/relationships" xmlns:p="http://schemas.openxmlformats.org/presentationml/2006/main">
   <p:cSld>
     <p:spTree>
       <p:nvGrpSpPr>
@@ -7978,11 +8038,18 @@
   <p:clrMapOvr>
     <a:masterClrMapping/>
   </p:clrMapOvr>
+  <p:timing>
+    <p:tnLst>
+      <p:par>
+        <p:cTn xmlns:p14="http://schemas.microsoft.com/office/powerpoint/2010/main" id="1" dur="indefinite" restart="never" nodeType="tmRoot"/>
+      </p:par>
+    </p:tnLst>
+  </p:timing>
 </p:sld>
 </file>
 
 <file path=ppt/slides/slide7.xml><?xml version="1.0" encoding="utf-8"?>
-<p:sld xmlns:a="http://schemas.openxmlformats.org/drawingml/2006/main" xmlns:r="http://schemas.openxmlformats.org/officeDocument/2006/relationships" xmlns:mc="http://schemas.openxmlformats.org/markup-compatibility/2006" xmlns:mv="urn:schemas-microsoft-com:mac:vml" xmlns:p="http://schemas.openxmlformats.org/presentationml/2006/main" mc:Ignorable="mv" mc:PreserveAttributes="mv:*">
+<p:sld xmlns:a="http://schemas.openxmlformats.org/drawingml/2006/main" xmlns:r="http://schemas.openxmlformats.org/officeDocument/2006/relationships" xmlns:p="http://schemas.openxmlformats.org/presentationml/2006/main">
   <p:cSld>
     <p:spTree>
       <p:nvGrpSpPr>
@@ -8044,12 +8111,20 @@
               <a:t>nohup</a:t>
             </a:r>
             <a:r>
-              <a:rPr lang="en-US" dirty="0" smtClean="0"/>
-              <a:t> ../</a:t>
+              <a:rPr lang="en-US" smtClean="0"/>
+              <a:t> </a:t>
+            </a:r>
+            <a:r>
+              <a:rPr lang="en-US" smtClean="0"/>
+              <a:t>.</a:t>
+            </a:r>
+            <a:r>
+              <a:rPr lang="en-US" dirty="0" smtClean="0"/>
+              <a:t>/</a:t>
             </a:r>
             <a:r>
               <a:rPr lang="en-US" dirty="0" err="1" smtClean="0"/>
-              <a:t>run.hierarchical.sh</a:t>
+              <a:t>run.hiero.sh</a:t>
             </a:r>
             <a:r>
               <a:rPr lang="en-US" dirty="0" smtClean="0"/>
@@ -8206,11 +8281,18 @@
   <p:clrMapOvr>
     <a:masterClrMapping/>
   </p:clrMapOvr>
+  <p:timing>
+    <p:tnLst>
+      <p:par>
+        <p:cTn xmlns:p14="http://schemas.microsoft.com/office/powerpoint/2010/main" id="1" dur="indefinite" restart="never" nodeType="tmRoot"/>
+      </p:par>
+    </p:tnLst>
+  </p:timing>
 </p:sld>
 </file>
 
 <file path=ppt/slides/slide8.xml><?xml version="1.0" encoding="utf-8"?>
-<p:sld xmlns:a="http://schemas.openxmlformats.org/drawingml/2006/main" xmlns:r="http://schemas.openxmlformats.org/officeDocument/2006/relationships" xmlns:mc="http://schemas.openxmlformats.org/markup-compatibility/2006" xmlns:mv="urn:schemas-microsoft-com:mac:vml" xmlns:p="http://schemas.openxmlformats.org/presentationml/2006/main" mc:Ignorable="mv" mc:PreserveAttributes="mv:*">
+<p:sld xmlns:a="http://schemas.openxmlformats.org/drawingml/2006/main" xmlns:r="http://schemas.openxmlformats.org/officeDocument/2006/relationships" xmlns:p="http://schemas.openxmlformats.org/presentationml/2006/main">
   <p:cSld>
     <p:spTree>
       <p:nvGrpSpPr>
@@ -8278,11 +8360,18 @@
   <p:clrMapOvr>
     <a:masterClrMapping/>
   </p:clrMapOvr>
+  <p:timing>
+    <p:tnLst>
+      <p:par>
+        <p:cTn xmlns:p14="http://schemas.microsoft.com/office/powerpoint/2010/main" id="1" dur="indefinite" restart="never" nodeType="tmRoot"/>
+      </p:par>
+    </p:tnLst>
+  </p:timing>
 </p:sld>
 </file>
 
 <file path=ppt/slides/slide9.xml><?xml version="1.0" encoding="utf-8"?>
-<p:sld xmlns:a="http://schemas.openxmlformats.org/drawingml/2006/main" xmlns:r="http://schemas.openxmlformats.org/officeDocument/2006/relationships" xmlns:mc="http://schemas.openxmlformats.org/markup-compatibility/2006" xmlns:mv="urn:schemas-microsoft-com:mac:vml" xmlns:p="http://schemas.openxmlformats.org/presentationml/2006/main" mc:Ignorable="mv" mc:PreserveAttributes="mv:*">
+<p:sld xmlns:a="http://schemas.openxmlformats.org/drawingml/2006/main" xmlns:r="http://schemas.openxmlformats.org/officeDocument/2006/relationships" xmlns:p="http://schemas.openxmlformats.org/presentationml/2006/main">
   <p:cSld>
     <p:spTree>
       <p:nvGrpSpPr>
@@ -8436,6 +8525,13 @@
   <p:clrMapOvr>
     <a:masterClrMapping/>
   </p:clrMapOvr>
+  <p:timing>
+    <p:tnLst>
+      <p:par>
+        <p:cTn xmlns:p14="http://schemas.microsoft.com/office/powerpoint/2010/main" id="1" dur="indefinite" restart="never" nodeType="tmRoot"/>
+      </p:par>
+    </p:tnLst>
+  </p:timing>
 </p:sld>
 </file>
 

</xml_diff>